<commit_message>
Updating powerpoint and adding new one
</commit_message>
<xml_diff>
--- a/08192022_Presentation.pptx
+++ b/08192022_Presentation.pptx
@@ -12,8 +12,7 @@
     <p:sldId id="259" r:id="rId6"/>
     <p:sldId id="263" r:id="rId7"/>
     <p:sldId id="264" r:id="rId8"/>
-    <p:sldId id="265" r:id="rId9"/>
-    <p:sldId id="262" r:id="rId10"/>
+    <p:sldId id="262" r:id="rId9"/>
   </p:sldIdLst>
   <p:sldSz cx="12192000" cy="6858000"/>
   <p:notesSz cx="6858000" cy="9144000"/>
@@ -394,7 +393,7 @@
           <a:p>
             <a:fld id="{B7D555DA-B0AA-FF4A-8DB7-56EDA8C2FDB8}" type="datetimeFigureOut">
               <a:rPr lang="en-US" smtClean="0"/>
-              <a:t>8/18/22</a:t>
+              <a:t>8/19/22</a:t>
             </a:fld>
             <a:endParaRPr lang="en-US"/>
           </a:p>
@@ -808,7 +807,7 @@
           <a:p>
             <a:fld id="{B7D555DA-B0AA-FF4A-8DB7-56EDA8C2FDB8}" type="datetimeFigureOut">
               <a:rPr lang="en-US" smtClean="0"/>
-              <a:t>8/18/22</a:t>
+              <a:t>8/19/22</a:t>
             </a:fld>
             <a:endParaRPr lang="en-US"/>
           </a:p>
@@ -1144,7 +1143,7 @@
           <a:p>
             <a:fld id="{B7D555DA-B0AA-FF4A-8DB7-56EDA8C2FDB8}" type="datetimeFigureOut">
               <a:rPr lang="en-US" smtClean="0"/>
-              <a:t>8/18/22</a:t>
+              <a:t>8/19/22</a:t>
             </a:fld>
             <a:endParaRPr lang="en-US"/>
           </a:p>
@@ -1549,7 +1548,7 @@
           <a:p>
             <a:fld id="{B7D555DA-B0AA-FF4A-8DB7-56EDA8C2FDB8}" type="datetimeFigureOut">
               <a:rPr lang="en-US" smtClean="0"/>
-              <a:t>8/18/22</a:t>
+              <a:t>8/19/22</a:t>
             </a:fld>
             <a:endParaRPr lang="en-US"/>
           </a:p>
@@ -2117,7 +2116,7 @@
           <a:p>
             <a:fld id="{B7D555DA-B0AA-FF4A-8DB7-56EDA8C2FDB8}" type="datetimeFigureOut">
               <a:rPr lang="en-US" smtClean="0"/>
-              <a:t>8/18/22</a:t>
+              <a:t>8/19/22</a:t>
             </a:fld>
             <a:endParaRPr lang="en-US"/>
           </a:p>
@@ -2798,7 +2797,7 @@
           <a:p>
             <a:fld id="{B7D555DA-B0AA-FF4A-8DB7-56EDA8C2FDB8}" type="datetimeFigureOut">
               <a:rPr lang="en-US" smtClean="0"/>
-              <a:t>8/18/22</a:t>
+              <a:t>8/19/22</a:t>
             </a:fld>
             <a:endParaRPr lang="en-US"/>
           </a:p>
@@ -3711,7 +3710,7 @@
           <a:p>
             <a:fld id="{B7D555DA-B0AA-FF4A-8DB7-56EDA8C2FDB8}" type="datetimeFigureOut">
               <a:rPr lang="en-US" smtClean="0"/>
-              <a:t>8/18/22</a:t>
+              <a:t>8/19/22</a:t>
             </a:fld>
             <a:endParaRPr lang="en-US"/>
           </a:p>
@@ -4024,7 +4023,7 @@
           <a:p>
             <a:fld id="{B7D555DA-B0AA-FF4A-8DB7-56EDA8C2FDB8}" type="datetimeFigureOut">
               <a:rPr lang="en-US" smtClean="0"/>
-              <a:t>8/18/22</a:t>
+              <a:t>8/19/22</a:t>
             </a:fld>
             <a:endParaRPr lang="en-US"/>
           </a:p>
@@ -4288,7 +4287,7 @@
           <a:p>
             <a:fld id="{B7D555DA-B0AA-FF4A-8DB7-56EDA8C2FDB8}" type="datetimeFigureOut">
               <a:rPr lang="en-US" smtClean="0"/>
-              <a:t>8/18/22</a:t>
+              <a:t>8/19/22</a:t>
             </a:fld>
             <a:endParaRPr lang="en-US"/>
           </a:p>
@@ -4611,7 +4610,7 @@
           <a:p>
             <a:fld id="{B7D555DA-B0AA-FF4A-8DB7-56EDA8C2FDB8}" type="datetimeFigureOut">
               <a:rPr lang="en-US" smtClean="0"/>
-              <a:t>8/18/22</a:t>
+              <a:t>8/19/22</a:t>
             </a:fld>
             <a:endParaRPr lang="en-US"/>
           </a:p>
@@ -5000,7 +4999,7 @@
           <a:p>
             <a:fld id="{B7D555DA-B0AA-FF4A-8DB7-56EDA8C2FDB8}" type="datetimeFigureOut">
               <a:rPr lang="en-US" smtClean="0"/>
-              <a:t>8/18/22</a:t>
+              <a:t>8/19/22</a:t>
             </a:fld>
             <a:endParaRPr lang="en-US"/>
           </a:p>
@@ -5376,7 +5375,7 @@
           <a:p>
             <a:fld id="{B7D555DA-B0AA-FF4A-8DB7-56EDA8C2FDB8}" type="datetimeFigureOut">
               <a:rPr lang="en-US" smtClean="0"/>
-              <a:t>8/18/22</a:t>
+              <a:t>8/19/22</a:t>
             </a:fld>
             <a:endParaRPr lang="en-US"/>
           </a:p>
@@ -5882,7 +5881,7 @@
           <a:p>
             <a:fld id="{B7D555DA-B0AA-FF4A-8DB7-56EDA8C2FDB8}" type="datetimeFigureOut">
               <a:rPr lang="en-US" smtClean="0"/>
-              <a:t>8/18/22</a:t>
+              <a:t>8/19/22</a:t>
             </a:fld>
             <a:endParaRPr lang="en-US"/>
           </a:p>
@@ -6139,7 +6138,7 @@
           <a:p>
             <a:fld id="{B7D555DA-B0AA-FF4A-8DB7-56EDA8C2FDB8}" type="datetimeFigureOut">
               <a:rPr lang="en-US" smtClean="0"/>
-              <a:t>8/18/22</a:t>
+              <a:t>8/19/22</a:t>
             </a:fld>
             <a:endParaRPr lang="en-US"/>
           </a:p>
@@ -6302,7 +6301,7 @@
           <a:p>
             <a:fld id="{B7D555DA-B0AA-FF4A-8DB7-56EDA8C2FDB8}" type="datetimeFigureOut">
               <a:rPr lang="en-US" smtClean="0"/>
-              <a:t>8/18/22</a:t>
+              <a:t>8/19/22</a:t>
             </a:fld>
             <a:endParaRPr lang="en-US"/>
           </a:p>
@@ -6692,7 +6691,7 @@
           <a:p>
             <a:fld id="{B7D555DA-B0AA-FF4A-8DB7-56EDA8C2FDB8}" type="datetimeFigureOut">
               <a:rPr lang="en-US" smtClean="0"/>
-              <a:t>8/18/22</a:t>
+              <a:t>8/19/22</a:t>
             </a:fld>
             <a:endParaRPr lang="en-US"/>
           </a:p>
@@ -7101,7 +7100,7 @@
           <a:p>
             <a:fld id="{B7D555DA-B0AA-FF4A-8DB7-56EDA8C2FDB8}" type="datetimeFigureOut">
               <a:rPr lang="en-US" smtClean="0"/>
-              <a:t>8/18/22</a:t>
+              <a:t>8/19/22</a:t>
             </a:fld>
             <a:endParaRPr lang="en-US"/>
           </a:p>
@@ -7345,7 +7344,7 @@
           <a:p>
             <a:fld id="{B7D555DA-B0AA-FF4A-8DB7-56EDA8C2FDB8}" type="datetimeFigureOut">
               <a:rPr lang="en-US" smtClean="0"/>
-              <a:t>8/18/22</a:t>
+              <a:t>8/19/22</a:t>
             </a:fld>
             <a:endParaRPr lang="en-US"/>
           </a:p>
@@ -8558,9 +8557,36 @@
   <p:cSld>
     <p:bg>
       <p:bgPr>
-        <a:solidFill>
-          <a:schemeClr val="bg1"/>
-        </a:solidFill>
+        <a:gradFill rotWithShape="1">
+          <a:gsLst>
+            <a:gs pos="0">
+              <a:schemeClr val="bg2">
+                <a:tint val="96000"/>
+                <a:shade val="100000"/>
+                <a:hueMod val="270000"/>
+                <a:satMod val="200000"/>
+                <a:lumMod val="128000"/>
+              </a:schemeClr>
+            </a:gs>
+            <a:gs pos="50000">
+              <a:schemeClr val="bg2">
+                <a:shade val="100000"/>
+                <a:hueMod val="100000"/>
+                <a:satMod val="110000"/>
+                <a:lumMod val="130000"/>
+              </a:schemeClr>
+            </a:gs>
+            <a:gs pos="100000">
+              <a:schemeClr val="bg2">
+                <a:shade val="78000"/>
+                <a:hueMod val="44000"/>
+                <a:satMod val="200000"/>
+                <a:lumMod val="69000"/>
+              </a:schemeClr>
+            </a:gs>
+          </a:gsLst>
+          <a:lin ang="2520000" scaled="0"/>
+        </a:gradFill>
         <a:effectLst/>
       </p:bgPr>
     </p:bg>
@@ -8596,18 +8622,18 @@
         </p:nvSpPr>
         <p:spPr>
           <a:xfrm>
-            <a:off x="630936" y="502920"/>
-            <a:ext cx="3419856" cy="1463040"/>
-          </a:xfrm>
-        </p:spPr>
-        <p:txBody>
-          <a:bodyPr anchor="ctr">
+            <a:off x="680321" y="753228"/>
+            <a:ext cx="9613861" cy="1080938"/>
+          </a:xfrm>
+        </p:spPr>
+        <p:txBody>
+          <a:bodyPr>
             <a:normAutofit/>
           </a:bodyPr>
           <a:lstStyle/>
           <a:p>
             <a:r>
-              <a:rPr lang="en-US" sz="4800"/>
+              <a:rPr lang="en-US"/>
               <a:t>Rothermel Code	</a:t>
             </a:r>
           </a:p>
@@ -8631,54 +8657,54 @@
         </p:nvSpPr>
         <p:spPr>
           <a:xfrm>
-            <a:off x="3654438" y="802022"/>
-            <a:ext cx="6894576" cy="1463040"/>
-          </a:xfrm>
-        </p:spPr>
-        <p:txBody>
-          <a:bodyPr anchor="ctr">
+            <a:off x="680322" y="2336873"/>
+            <a:ext cx="3489341" cy="3599316"/>
+          </a:xfrm>
+        </p:spPr>
+        <p:txBody>
+          <a:bodyPr>
             <a:normAutofit/>
           </a:bodyPr>
           <a:lstStyle/>
           <a:p>
             <a:r>
-              <a:rPr lang="en-US" sz="1400" dirty="0"/>
+              <a:rPr lang="en-US" sz="1800" dirty="0"/>
               <a:t>After modifying the code to take in the adjustment factors as inputs, and adding them to the code, there is a much greater difference among the rate of spread</a:t>
             </a:r>
           </a:p>
           <a:p>
             <a:r>
-              <a:rPr lang="en-US" sz="1400" dirty="0"/>
+              <a:rPr lang="en-US" sz="1800" dirty="0"/>
               <a:t>Now adjustment factors will better change the variables in the code</a:t>
             </a:r>
           </a:p>
           <a:p>
             <a:pPr lvl="1"/>
             <a:r>
-              <a:rPr lang="en-US" sz="1400" dirty="0"/>
+              <a:rPr lang="en-US" sz="1800" dirty="0"/>
               <a:t>I.e. 0.5 </a:t>
             </a:r>
             <a:r>
-              <a:rPr lang="en-US" sz="1400" dirty="0" err="1"/>
+              <a:rPr lang="en-US" sz="1800" dirty="0" err="1"/>
               <a:t>adjw</a:t>
             </a:r>
             <a:r>
-              <a:rPr lang="en-US" sz="1400" dirty="0"/>
+              <a:rPr lang="en-US" sz="1800" dirty="0"/>
               <a:t> will cut the wind speeds in half</a:t>
             </a:r>
           </a:p>
           <a:p>
             <a:pPr lvl="1"/>
-            <a:endParaRPr lang="en-US" sz="1400" dirty="0"/>
+            <a:endParaRPr lang="en-US" sz="1800" dirty="0"/>
           </a:p>
         </p:txBody>
       </p:sp>
       <p:pic>
         <p:nvPicPr>
-          <p:cNvPr id="5" name="Picture 4">
+          <p:cNvPr id="7" name="Picture 6">
             <a:extLst>
               <a:ext uri="{FF2B5EF4-FFF2-40B4-BE49-F238E27FC236}">
-                <a16:creationId xmlns:a16="http://schemas.microsoft.com/office/drawing/2014/main" id="{53D3CE82-056E-1BF5-54AF-94D8D0DEB0A4}"/>
+                <a16:creationId xmlns:a16="http://schemas.microsoft.com/office/drawing/2014/main" id="{C7F3E701-0F99-6F2D-EA1B-1E6442F38979}"/>
               </a:ext>
             </a:extLst>
           </p:cNvPr>
@@ -8695,14 +8721,56 @@
         </p:blipFill>
         <p:spPr>
           <a:xfrm>
-            <a:off x="1060992" y="2011680"/>
-            <a:ext cx="10070015" cy="4858873"/>
+            <a:off x="4253486" y="3018079"/>
+            <a:ext cx="7537705" cy="2236903"/>
           </a:xfrm>
           <a:prstGeom prst="rect">
             <a:avLst/>
           </a:prstGeom>
+          <a:ln>
+            <a:noFill/>
+          </a:ln>
+          <a:effectLst>
+            <a:outerShdw blurRad="76200" dist="63500" dir="5040000" algn="tl" rotWithShape="0">
+              <a:srgbClr val="000000">
+                <a:alpha val="41000"/>
+              </a:srgbClr>
+            </a:outerShdw>
+          </a:effectLst>
         </p:spPr>
       </p:pic>
+      <p:sp>
+        <p:nvSpPr>
+          <p:cNvPr id="6" name="TextBox 5">
+            <a:extLst>
+              <a:ext uri="{FF2B5EF4-FFF2-40B4-BE49-F238E27FC236}">
+                <a16:creationId xmlns:a16="http://schemas.microsoft.com/office/drawing/2014/main" id="{69CBCE39-E9F4-96EF-E378-D29FBF75627E}"/>
+              </a:ext>
+            </a:extLst>
+          </p:cNvPr>
+          <p:cNvSpPr txBox="1"/>
+          <p:nvPr/>
+        </p:nvSpPr>
+        <p:spPr>
+          <a:xfrm>
+            <a:off x="8495607" y="2460567"/>
+            <a:ext cx="184731" cy="369332"/>
+          </a:xfrm>
+          <a:prstGeom prst="rect">
+            <a:avLst/>
+          </a:prstGeom>
+          <a:noFill/>
+        </p:spPr>
+        <p:txBody>
+          <a:bodyPr wrap="none" rtlCol="0">
+            <a:spAutoFit/>
+          </a:bodyPr>
+          <a:lstStyle/>
+          <a:p>
+            <a:endParaRPr lang="en-US" dirty="0"/>
+          </a:p>
+        </p:txBody>
+      </p:sp>
     </p:spTree>
     <p:extLst>
       <p:ext uri="{BB962C8B-B14F-4D97-AF65-F5344CB8AC3E}">
@@ -8877,10 +8945,10 @@
       </p:sp>
       <p:pic>
         <p:nvPicPr>
-          <p:cNvPr id="3" name="Picture 2">
+          <p:cNvPr id="4" name="Picture 3">
             <a:extLst>
               <a:ext uri="{FF2B5EF4-FFF2-40B4-BE49-F238E27FC236}">
-                <a16:creationId xmlns:a16="http://schemas.microsoft.com/office/drawing/2014/main" id="{72E2F4BB-09F6-5694-8AC0-44C5C4FA9AC0}"/>
+                <a16:creationId xmlns:a16="http://schemas.microsoft.com/office/drawing/2014/main" id="{0B86DBD4-AC0C-EDFB-3A29-697967336B36}"/>
               </a:ext>
             </a:extLst>
           </p:cNvPr>
@@ -8897,37 +8965,7 @@
         </p:blipFill>
         <p:spPr>
           <a:xfrm>
-            <a:off x="0" y="1267897"/>
-            <a:ext cx="5595552" cy="5595552"/>
-          </a:xfrm>
-          <a:prstGeom prst="rect">
-            <a:avLst/>
-          </a:prstGeom>
-        </p:spPr>
-      </p:pic>
-      <p:pic>
-        <p:nvPicPr>
-          <p:cNvPr id="4" name="Picture 3">
-            <a:extLst>
-              <a:ext uri="{FF2B5EF4-FFF2-40B4-BE49-F238E27FC236}">
-                <a16:creationId xmlns:a16="http://schemas.microsoft.com/office/drawing/2014/main" id="{0B86DBD4-AC0C-EDFB-3A29-697967336B36}"/>
-              </a:ext>
-            </a:extLst>
-          </p:cNvPr>
-          <p:cNvPicPr>
-            <a:picLocks noChangeAspect="1"/>
-          </p:cNvPicPr>
-          <p:nvPr/>
-        </p:nvPicPr>
-        <p:blipFill>
-          <a:blip r:embed="rId3"/>
-          <a:stretch>
-            <a:fillRect/>
-          </a:stretch>
-        </p:blipFill>
-        <p:spPr>
-          <a:xfrm>
-            <a:off x="5595552" y="1267897"/>
+            <a:off x="5550679" y="2548057"/>
             <a:ext cx="6428896" cy="2270253"/>
           </a:xfrm>
           <a:prstGeom prst="rect">
@@ -8949,7 +8987,7 @@
         </p:nvSpPr>
         <p:spPr>
           <a:xfrm>
-            <a:off x="5802822" y="4554468"/>
+            <a:off x="167552" y="3214984"/>
             <a:ext cx="6221626" cy="646331"/>
           </a:xfrm>
           <a:prstGeom prst="rect">
@@ -9013,99 +9051,6 @@
           <p:cNvPr id="2" name="Title 1">
             <a:extLst>
               <a:ext uri="{FF2B5EF4-FFF2-40B4-BE49-F238E27FC236}">
-                <a16:creationId xmlns:a16="http://schemas.microsoft.com/office/drawing/2014/main" id="{E269ED99-4282-4279-E819-B25D16261193}"/>
-              </a:ext>
-            </a:extLst>
-          </p:cNvPr>
-          <p:cNvSpPr>
-            <a:spLocks noGrp="1"/>
-          </p:cNvSpPr>
-          <p:nvPr>
-            <p:ph type="title"/>
-          </p:nvPr>
-        </p:nvSpPr>
-        <p:spPr/>
-        <p:txBody>
-          <a:bodyPr/>
-          <a:lstStyle/>
-          <a:p>
-            <a:r>
-              <a:rPr lang="en-US" dirty="0"/>
-              <a:t>Questions</a:t>
-            </a:r>
-          </a:p>
-        </p:txBody>
-      </p:sp>
-      <p:sp>
-        <p:nvSpPr>
-          <p:cNvPr id="3" name="Content Placeholder 2">
-            <a:extLst>
-              <a:ext uri="{FF2B5EF4-FFF2-40B4-BE49-F238E27FC236}">
-                <a16:creationId xmlns:a16="http://schemas.microsoft.com/office/drawing/2014/main" id="{C4D4BCD1-2364-DCC3-E222-528FA7CD4AAB}"/>
-              </a:ext>
-            </a:extLst>
-          </p:cNvPr>
-          <p:cNvSpPr>
-            <a:spLocks noGrp="1"/>
-          </p:cNvSpPr>
-          <p:nvPr>
-            <p:ph idx="1"/>
-          </p:nvPr>
-        </p:nvSpPr>
-        <p:spPr/>
-        <p:txBody>
-          <a:bodyPr/>
-          <a:lstStyle/>
-          <a:p>
-            <a:r>
-              <a:rPr lang="en-US" dirty="0"/>
-              <a:t>For computing the roughness length, I modified the equation to solve for z_0, and I’m getting varying results per height level, are there any specific results I should stick with for this experiment?</a:t>
-            </a:r>
-          </a:p>
-          <a:p>
-            <a:pPr lvl="1"/>
-            <a:r>
-              <a:rPr lang="en-US" dirty="0"/>
-              <a:t>Should I use the result closest to the ground or should I average them all out?</a:t>
-            </a:r>
-          </a:p>
-        </p:txBody>
-      </p:sp>
-    </p:spTree>
-    <p:extLst>
-      <p:ext uri="{BB962C8B-B14F-4D97-AF65-F5344CB8AC3E}">
-        <p14:creationId xmlns:p14="http://schemas.microsoft.com/office/powerpoint/2010/main" val="3996801625"/>
-      </p:ext>
-    </p:extLst>
-  </p:cSld>
-  <p:clrMapOvr>
-    <a:masterClrMapping/>
-  </p:clrMapOvr>
-</p:sld>
-</file>
-
-<file path=ppt/slides/slide9.xml><?xml version="1.0" encoding="utf-8"?>
-<p:sld xmlns:a="http://schemas.openxmlformats.org/drawingml/2006/main" xmlns:r="http://schemas.openxmlformats.org/officeDocument/2006/relationships" xmlns:p="http://schemas.openxmlformats.org/presentationml/2006/main">
-  <p:cSld>
-    <p:spTree>
-      <p:nvGrpSpPr>
-        <p:cNvPr id="1" name=""/>
-        <p:cNvGrpSpPr/>
-        <p:nvPr/>
-      </p:nvGrpSpPr>
-      <p:grpSpPr>
-        <a:xfrm>
-          <a:off x="0" y="0"/>
-          <a:ext cx="0" cy="0"/>
-          <a:chOff x="0" y="0"/>
-          <a:chExt cx="0" cy="0"/>
-        </a:xfrm>
-      </p:grpSpPr>
-      <p:sp>
-        <p:nvSpPr>
-          <p:cNvPr id="2" name="Title 1">
-            <a:extLst>
-              <a:ext uri="{FF2B5EF4-FFF2-40B4-BE49-F238E27FC236}">
                 <a16:creationId xmlns:a16="http://schemas.microsoft.com/office/drawing/2014/main" id="{22C56395-3102-6AC5-7B79-2CE65BDB373C}"/>
               </a:ext>
             </a:extLst>
@@ -9148,7 +9093,7 @@
         <p:spPr/>
         <p:txBody>
           <a:bodyPr>
-            <a:normAutofit/>
+            <a:normAutofit lnSpcReduction="10000"/>
           </a:bodyPr>
           <a:lstStyle/>
           <a:p>
@@ -9174,6 +9119,12 @@
           </a:p>
           <a:p>
             <a:r>
+              <a:rPr lang="en-US" sz="2300" dirty="0"/>
+              <a:t>Finish Z_0 calculation</a:t>
+            </a:r>
+          </a:p>
+          <a:p>
+            <a:r>
               <a:rPr lang="en-US" sz="1900" dirty="0"/>
               <a:t>Modify the </a:t>
             </a:r>
@@ -9196,6 +9147,12 @@
             <a:r>
               <a:rPr lang="en-US" sz="1900" dirty="0"/>
               <a:t> file</a:t>
+            </a:r>
+          </a:p>
+          <a:p>
+            <a:r>
+              <a:rPr lang="en-US" sz="2300" dirty="0"/>
+              <a:t>Interpolate pot. temperatures for the SODAR data for the sounding</a:t>
             </a:r>
           </a:p>
           <a:p>

</xml_diff>